<commit_message>
Added test files for screen reader talk.
</commit_message>
<xml_diff>
--- a/Presentations/2024 Presentations/Accessibility Testing with Screen Reader.pptx
+++ b/Presentations/2024 Presentations/Accessibility Testing with Screen Reader.pptx
@@ -240,7 +240,7 @@
           <a:p>
             <a:fld id="{EE5432EF-245E-40EF-B3FF-B189D54EF7CF}" type="datetimeFigureOut">
               <a:rPr lang="en-US" smtClean="0"/>
-              <a:t>3/18/2024</a:t>
+              <a:t>3/26/2024</a:t>
             </a:fld>
             <a:endParaRPr lang="en-US" dirty="0"/>
           </a:p>
@@ -417,7 +417,7 @@
           <a:p>
             <a:fld id="{6AF08D30-F807-4561-A81E-6E077448AA00}" type="datetimeFigureOut">
               <a:rPr lang="en-US" smtClean="0"/>
-              <a:t>3/18/2024</a:t>
+              <a:t>3/26/2024</a:t>
             </a:fld>
             <a:endParaRPr lang="en-US" dirty="0"/>
           </a:p>
@@ -4873,7 +4873,7 @@
           <a:p>
             <a:fld id="{D40CD771-3B55-4F71-A412-F2B875D7B621}" type="datetime1">
               <a:rPr lang="en-US" smtClean="0"/>
-              <a:t>3/18/2024</a:t>
+              <a:t>3/26/2024</a:t>
             </a:fld>
             <a:endParaRPr lang="en-US" dirty="0"/>
           </a:p>
@@ -5444,7 +5444,7 @@
           <a:p>
             <a:fld id="{DD565FA3-C3AD-4028-B5DD-84D9CECFBB89}" type="datetime1">
               <a:rPr lang="en-US" smtClean="0"/>
-              <a:t>3/18/2024</a:t>
+              <a:t>3/26/2024</a:t>
             </a:fld>
             <a:endParaRPr lang="en-US" dirty="0"/>
           </a:p>
@@ -6479,7 +6479,7 @@
           <a:p>
             <a:fld id="{3BD4ADB0-2200-4ADA-8C14-3FC7CEFC81F7}" type="datetime1">
               <a:rPr lang="en-US" smtClean="0"/>
-              <a:t>3/18/2024</a:t>
+              <a:t>3/26/2024</a:t>
             </a:fld>
             <a:endParaRPr lang="en-US" dirty="0"/>
           </a:p>
@@ -7365,7 +7365,7 @@
           <a:p>
             <a:fld id="{3CD0E6B3-1484-43A7-852A-7CEAE8B79EC0}" type="datetime1">
               <a:rPr lang="en-US" smtClean="0"/>
-              <a:t>3/18/2024</a:t>
+              <a:t>3/26/2024</a:t>
             </a:fld>
             <a:endParaRPr lang="en-US" dirty="0"/>
           </a:p>
@@ -8683,7 +8683,7 @@
           <a:p>
             <a:fld id="{2BEFEC11-A4AD-4C89-8ACD-8FF27A79E89E}" type="datetime1">
               <a:rPr lang="en-US" smtClean="0"/>
-              <a:t>3/18/2024</a:t>
+              <a:t>3/26/2024</a:t>
             </a:fld>
             <a:endParaRPr lang="en-US" dirty="0"/>
           </a:p>
@@ -10399,7 +10399,7 @@
           <a:p>
             <a:fld id="{3135798D-CCB3-4270-966B-D99874338BAB}" type="datetime1">
               <a:rPr lang="en-US" smtClean="0"/>
-              <a:t>3/18/2024</a:t>
+              <a:t>3/26/2024</a:t>
             </a:fld>
             <a:endParaRPr lang="en-US" dirty="0"/>
           </a:p>
@@ -12120,7 +12120,7 @@
           <a:p>
             <a:fld id="{D2A641F7-70A7-4C80-8B54-47DC93A76399}" type="datetime1">
               <a:rPr lang="en-US" smtClean="0"/>
-              <a:t>3/18/2024</a:t>
+              <a:t>3/26/2024</a:t>
             </a:fld>
             <a:endParaRPr lang="en-US" dirty="0"/>
           </a:p>
@@ -12536,7 +12536,7 @@
           <a:p>
             <a:fld id="{1FFC9F40-B774-4ADF-976D-7826EBFC23FC}" type="datetime1">
               <a:rPr lang="en-US" smtClean="0"/>
-              <a:t>3/18/2024</a:t>
+              <a:t>3/26/2024</a:t>
             </a:fld>
             <a:endParaRPr lang="en-US" dirty="0"/>
           </a:p>
@@ -14420,7 +14420,7 @@
           <a:p>
             <a:fld id="{1EA8AE22-5AA9-4E68-B910-53534A46D111}" type="datetime1">
               <a:rPr lang="en-US" smtClean="0"/>
-              <a:t>3/18/2024</a:t>
+              <a:t>3/26/2024</a:t>
             </a:fld>
             <a:endParaRPr lang="en-US" dirty="0"/>
           </a:p>
@@ -15405,7 +15405,7 @@
           <a:p>
             <a:fld id="{F342984A-CABF-4466-A44F-F97A782DF502}" type="datetime1">
               <a:rPr lang="en-US" smtClean="0"/>
-              <a:t>3/18/2024</a:t>
+              <a:t>3/26/2024</a:t>
             </a:fld>
             <a:endParaRPr lang="en-US" dirty="0"/>
           </a:p>
@@ -16377,7 +16377,7 @@
           <a:p>
             <a:fld id="{8D28DA4F-55EE-4774-AFC6-2F73931F16BE}" type="datetime1">
               <a:rPr lang="en-US" smtClean="0"/>
-              <a:t>3/18/2024</a:t>
+              <a:t>3/26/2024</a:t>
             </a:fld>
             <a:endParaRPr lang="en-US" dirty="0"/>
           </a:p>
@@ -17591,7 +17591,7 @@
           <a:p>
             <a:fld id="{49BF4A40-B160-41AB-BD66-51E4EFBE2604}" type="datetime1">
               <a:rPr lang="en-US" smtClean="0"/>
-              <a:t>3/18/2024</a:t>
+              <a:t>3/26/2024</a:t>
             </a:fld>
             <a:endParaRPr lang="en-US" dirty="0"/>
           </a:p>
@@ -18911,7 +18911,7 @@
           <a:p>
             <a:fld id="{A2D678BB-696D-42DB-BEC8-FB9987E03170}" type="datetime1">
               <a:rPr lang="en-US" smtClean="0"/>
-              <a:t>3/18/2024</a:t>
+              <a:t>3/26/2024</a:t>
             </a:fld>
             <a:endParaRPr lang="en-US" dirty="0"/>
           </a:p>
@@ -21290,7 +21290,7 @@
           <a:p>
             <a:fld id="{1162C2D5-1148-46A1-BEF2-DD9C492A8B49}" type="datetime1">
               <a:rPr lang="en-US" smtClean="0"/>
-              <a:t>3/18/2024</a:t>
+              <a:t>3/26/2024</a:t>
             </a:fld>
             <a:endParaRPr lang="en-US" dirty="0"/>
           </a:p>
@@ -23711,7 +23711,7 @@
           <a:p>
             <a:fld id="{965B5B8E-CEE3-4EB8-9D7E-B72C8551397A}" type="datetime1">
               <a:rPr lang="en-US" smtClean="0"/>
-              <a:t>3/18/2024</a:t>
+              <a:t>3/26/2024</a:t>
             </a:fld>
             <a:endParaRPr lang="en-US" dirty="0"/>
           </a:p>
@@ -25396,7 +25396,7 @@
           <a:p>
             <a:fld id="{76A4DFCB-51DE-424A-8B5B-467EFB151E38}" type="datetime1">
               <a:rPr lang="en-US" smtClean="0"/>
-              <a:t>3/18/2024</a:t>
+              <a:t>3/26/2024</a:t>
             </a:fld>
             <a:endParaRPr lang="en-US" dirty="0"/>
           </a:p>
@@ -25646,7 +25646,7 @@
           <a:p>
             <a:fld id="{CE7CABBA-7921-40BC-AA51-20F01765FD57}" type="datetime1">
               <a:rPr lang="en-US" smtClean="0"/>
-              <a:t>3/18/2024</a:t>
+              <a:t>3/26/2024</a:t>
             </a:fld>
             <a:endParaRPr lang="en-US" dirty="0"/>
           </a:p>
@@ -26937,7 +26937,7 @@
           <a:p>
             <a:fld id="{EBA72B5A-673D-4607-9FF7-CCF53A6CFB8C}" type="datetime1">
               <a:rPr lang="en-US" smtClean="0"/>
-              <a:t>3/18/2024</a:t>
+              <a:t>3/26/2024</a:t>
             </a:fld>
             <a:endParaRPr lang="en-US" dirty="0"/>
           </a:p>
@@ -27324,7 +27324,7 @@
           <a:p>
             <a:fld id="{365C6142-4DC0-4393-AD7A-3943A8E630E4}" type="datetime1">
               <a:rPr lang="en-US" smtClean="0"/>
-              <a:t>3/18/2024</a:t>
+              <a:t>3/26/2024</a:t>
             </a:fld>
             <a:endParaRPr lang="en-US" dirty="0"/>
           </a:p>
@@ -28432,7 +28432,7 @@
           <a:p>
             <a:fld id="{2DE70F3C-A523-425F-99C2-A38FEF5AAA8E}" type="datetime1">
               <a:rPr lang="en-US" smtClean="0"/>
-              <a:t>3/18/2024</a:t>
+              <a:t>3/26/2024</a:t>
             </a:fld>
             <a:endParaRPr lang="en-US" dirty="0"/>
           </a:p>
@@ -28576,7 +28576,7 @@
             </a:r>
             <a:r>
               <a:rPr lang="en-US" dirty="0"/>
-              <a:t>: If you ever use operating system color filter settings, note that those are often not visible to people who may be watching you streaming.</a:t>
+              <a:t>: If  you are using operating system color filter settings, note that those are often not visible to people who may be watching you streaming.</a:t>
             </a:r>
           </a:p>
         </p:txBody>
@@ -28677,7 +28677,7 @@
           <a:p>
             <a:fld id="{2A82BCC9-1E0F-4681-A8CA-371CB2B2FD36}" type="datetime1">
               <a:rPr lang="en-US" smtClean="0"/>
-              <a:t>3/18/2024</a:t>
+              <a:t>3/26/2024</a:t>
             </a:fld>
             <a:endParaRPr lang="en-US" dirty="0"/>
           </a:p>
@@ -28957,7 +28957,7 @@
           <a:p>
             <a:fld id="{1E6DE020-595E-4414-9FD4-E492968BB4DD}" type="datetime1">
               <a:rPr lang="en-US" smtClean="0"/>
-              <a:t>3/18/2024</a:t>
+              <a:t>3/26/2024</a:t>
             </a:fld>
             <a:endParaRPr lang="en-US" dirty="0"/>
           </a:p>
@@ -29147,7 +29147,7 @@
           <a:p>
             <a:fld id="{09C89640-83B5-41BC-A234-8A25CEA3CA37}" type="datetime1">
               <a:rPr lang="en-US" smtClean="0"/>
-              <a:t>3/18/2024</a:t>
+              <a:t>3/26/2024</a:t>
             </a:fld>
             <a:endParaRPr lang="en-US" dirty="0"/>
           </a:p>
@@ -29646,7 +29646,7 @@
           <a:p>
             <a:fld id="{1EA8AE22-5AA9-4E68-B910-53534A46D111}" type="datetime1">
               <a:rPr lang="en-US" smtClean="0"/>
-              <a:t>3/18/2024</a:t>
+              <a:t>3/26/2024</a:t>
             </a:fld>
             <a:endParaRPr lang="en-US" dirty="0"/>
           </a:p>
@@ -29839,7 +29839,7 @@
           <a:p>
             <a:fld id="{02020E9F-7472-46E2-925D-3834C3399EB8}" type="datetime1">
               <a:rPr lang="en-US" smtClean="0"/>
-              <a:t>3/18/2024</a:t>
+              <a:t>3/26/2024</a:t>
             </a:fld>
             <a:endParaRPr lang="en-US" dirty="0"/>
           </a:p>
@@ -30042,7 +30042,7 @@
           <a:p>
             <a:fld id="{FE57B65C-736A-463A-B878-00376E835189}" type="datetime1">
               <a:rPr lang="en-US" smtClean="0"/>
-              <a:t>3/18/2024</a:t>
+              <a:t>3/26/2024</a:t>
             </a:fld>
             <a:endParaRPr lang="en-US" dirty="0"/>
           </a:p>
@@ -30243,7 +30243,7 @@
           <a:p>
             <a:fld id="{F62B3EC1-C48E-40CA-B644-780608C10782}" type="datetime1">
               <a:rPr lang="en-US" smtClean="0"/>
-              <a:t>3/18/2024</a:t>
+              <a:t>3/26/2024</a:t>
             </a:fld>
             <a:endParaRPr lang="en-US" dirty="0"/>
           </a:p>
@@ -30503,7 +30503,7 @@
           <a:p>
             <a:fld id="{D848C455-CDB2-4208-A65A-BF4D86A5E68B}" type="datetime1">
               <a:rPr lang="en-US" smtClean="0"/>
-              <a:t>3/18/2024</a:t>
+              <a:t>3/26/2024</a:t>
             </a:fld>
             <a:endParaRPr lang="en-US" dirty="0"/>
           </a:p>
@@ -30681,7 +30681,7 @@
           <a:p>
             <a:fld id="{CDC15CAB-FD5C-4E8D-A715-31333DAF8D3F}" type="datetime1">
               <a:rPr lang="en-US" smtClean="0"/>
-              <a:t>3/18/2024</a:t>
+              <a:t>3/26/2024</a:t>
             </a:fld>
             <a:endParaRPr lang="en-US" dirty="0"/>
           </a:p>
@@ -30884,7 +30884,7 @@
           <a:p>
             <a:fld id="{11B39263-7CDE-4839-88A7-EB9F08F894B1}" type="datetime1">
               <a:rPr lang="en-US" smtClean="0"/>
-              <a:t>3/18/2024</a:t>
+              <a:t>3/26/2024</a:t>
             </a:fld>
             <a:endParaRPr lang="en-US" dirty="0"/>
           </a:p>
@@ -31787,23 +31787,12 @@
 </file>
 
 <file path=customXml/item1.xml><?xml version="1.0" encoding="utf-8"?>
-<p:properties xmlns:p="http://schemas.microsoft.com/office/2006/metadata/properties" xmlns:xsi="http://www.w3.org/2001/XMLSchema-instance" xmlns:pc="http://schemas.microsoft.com/office/infopath/2007/PartnerControls">
-  <documentManagement>
-    <_ip_UnifiedCompliancePolicyUIAction xmlns="http://schemas.microsoft.com/sharepoint/v3" xsi:nil="true"/>
-    <Image xmlns="71af3243-3dd4-4a8d-8c0d-dd76da1f02a5">
-      <Url xsi:nil="true"/>
-      <Description xsi:nil="true"/>
-    </Image>
-    <Status xmlns="71af3243-3dd4-4a8d-8c0d-dd76da1f02a5">Not started</Status>
-    <Background xmlns="71af3243-3dd4-4a8d-8c0d-dd76da1f02a5">false</Background>
-    <_ip_UnifiedCompliancePolicyProperties xmlns="http://schemas.microsoft.com/sharepoint/v3" xsi:nil="true"/>
-    <ImageTagsTaxHTField xmlns="71af3243-3dd4-4a8d-8c0d-dd76da1f02a5">
-      <Terms xmlns="http://schemas.microsoft.com/office/infopath/2007/PartnerControls"/>
-    </ImageTagsTaxHTField>
-    <TaxCatchAll xmlns="230e9df3-be65-4c73-a93b-d1236ebd677e" xsi:nil="true"/>
-    <MediaServiceKeyPoints xmlns="71af3243-3dd4-4a8d-8c0d-dd76da1f02a5" xsi:nil="true"/>
-  </documentManagement>
-</p:properties>
+<?mso-contentType ?>
+<FormTemplates xmlns="http://schemas.microsoft.com/sharepoint/v3/contenttype/forms">
+  <Display>DocumentLibraryForm</Display>
+  <Edit>DocumentLibraryForm</Edit>
+  <New>DocumentLibraryForm</New>
+</FormTemplates>
 </file>
 
 <file path=customXml/item2.xml><?xml version="1.0" encoding="utf-8"?>
@@ -32119,29 +32108,29 @@
 </file>
 
 <file path=customXml/item3.xml><?xml version="1.0" encoding="utf-8"?>
-<?mso-contentType ?>
-<FormTemplates xmlns="http://schemas.microsoft.com/sharepoint/v3/contenttype/forms">
-  <Display>DocumentLibraryForm</Display>
-  <Edit>DocumentLibraryForm</Edit>
-  <New>DocumentLibraryForm</New>
-</FormTemplates>
+<p:properties xmlns:p="http://schemas.microsoft.com/office/2006/metadata/properties" xmlns:xsi="http://www.w3.org/2001/XMLSchema-instance" xmlns:pc="http://schemas.microsoft.com/office/infopath/2007/PartnerControls">
+  <documentManagement>
+    <_ip_UnifiedCompliancePolicyUIAction xmlns="http://schemas.microsoft.com/sharepoint/v3" xsi:nil="true"/>
+    <Image xmlns="71af3243-3dd4-4a8d-8c0d-dd76da1f02a5">
+      <Url xsi:nil="true"/>
+      <Description xsi:nil="true"/>
+    </Image>
+    <Status xmlns="71af3243-3dd4-4a8d-8c0d-dd76da1f02a5">Not started</Status>
+    <Background xmlns="71af3243-3dd4-4a8d-8c0d-dd76da1f02a5">false</Background>
+    <_ip_UnifiedCompliancePolicyProperties xmlns="http://schemas.microsoft.com/sharepoint/v3" xsi:nil="true"/>
+    <ImageTagsTaxHTField xmlns="71af3243-3dd4-4a8d-8c0d-dd76da1f02a5">
+      <Terms xmlns="http://schemas.microsoft.com/office/infopath/2007/PartnerControls"/>
+    </ImageTagsTaxHTField>
+    <TaxCatchAll xmlns="230e9df3-be65-4c73-a93b-d1236ebd677e" xsi:nil="true"/>
+    <MediaServiceKeyPoints xmlns="71af3243-3dd4-4a8d-8c0d-dd76da1f02a5" xsi:nil="true"/>
+  </documentManagement>
+</p:properties>
 </file>
 
 <file path=customXml/itemProps1.xml><?xml version="1.0" encoding="utf-8"?>
-<ds:datastoreItem xmlns:ds="http://schemas.openxmlformats.org/officeDocument/2006/customXml" ds:itemID="{55F65D0A-9CCC-4F61-B2C0-E968BCA5F60A}">
+<ds:datastoreItem xmlns:ds="http://schemas.openxmlformats.org/officeDocument/2006/customXml" ds:itemID="{E6C52E68-191B-4883-A1EE-52F93DB694AA}">
   <ds:schemaRefs>
-    <ds:schemaRef ds:uri="http://schemas.microsoft.com/office/2006/metadata/properties"/>
-    <ds:schemaRef ds:uri="http://schemas.microsoft.com/sharepoint/v3"/>
-    <ds:schemaRef ds:uri="http://schemas.microsoft.com/office/2006/documentManagement/types"/>
-    <ds:schemaRef ds:uri="http://purl.org/dc/elements/1.1/"/>
-    <ds:schemaRef ds:uri="http://schemas.openxmlformats.org/package/2006/metadata/core-properties"/>
-    <ds:schemaRef ds:uri="http://www.w3.org/XML/1998/namespace"/>
-    <ds:schemaRef ds:uri="http://purl.org/dc/dcmitype/"/>
-    <ds:schemaRef ds:uri="http://schemas.microsoft.com/office/infopath/2007/PartnerControls"/>
-    <ds:schemaRef ds:uri="230e9df3-be65-4c73-a93b-d1236ebd677e"/>
-    <ds:schemaRef ds:uri="16c05727-aa75-4e4a-9b5f-8a80a1165891"/>
-    <ds:schemaRef ds:uri="71af3243-3dd4-4a8d-8c0d-dd76da1f02a5"/>
-    <ds:schemaRef ds:uri="http://purl.org/dc/terms/"/>
+    <ds:schemaRef ds:uri="http://schemas.microsoft.com/sharepoint/v3/contenttype/forms"/>
   </ds:schemaRefs>
 </ds:datastoreItem>
 </file>
@@ -32168,9 +32157,20 @@
 </file>
 
 <file path=customXml/itemProps3.xml><?xml version="1.0" encoding="utf-8"?>
-<ds:datastoreItem xmlns:ds="http://schemas.openxmlformats.org/officeDocument/2006/customXml" ds:itemID="{E6C52E68-191B-4883-A1EE-52F93DB694AA}">
+<ds:datastoreItem xmlns:ds="http://schemas.openxmlformats.org/officeDocument/2006/customXml" ds:itemID="{55F65D0A-9CCC-4F61-B2C0-E968BCA5F60A}">
   <ds:schemaRefs>
-    <ds:schemaRef ds:uri="http://schemas.microsoft.com/sharepoint/v3/contenttype/forms"/>
+    <ds:schemaRef ds:uri="http://schemas.microsoft.com/office/2006/metadata/properties"/>
+    <ds:schemaRef ds:uri="http://schemas.microsoft.com/sharepoint/v3"/>
+    <ds:schemaRef ds:uri="http://schemas.microsoft.com/office/2006/documentManagement/types"/>
+    <ds:schemaRef ds:uri="http://purl.org/dc/elements/1.1/"/>
+    <ds:schemaRef ds:uri="http://schemas.openxmlformats.org/package/2006/metadata/core-properties"/>
+    <ds:schemaRef ds:uri="http://www.w3.org/XML/1998/namespace"/>
+    <ds:schemaRef ds:uri="http://purl.org/dc/dcmitype/"/>
+    <ds:schemaRef ds:uri="http://schemas.microsoft.com/office/infopath/2007/PartnerControls"/>
+    <ds:schemaRef ds:uri="230e9df3-be65-4c73-a93b-d1236ebd677e"/>
+    <ds:schemaRef ds:uri="16c05727-aa75-4e4a-9b5f-8a80a1165891"/>
+    <ds:schemaRef ds:uri="71af3243-3dd4-4a8d-8c0d-dd76da1f02a5"/>
+    <ds:schemaRef ds:uri="http://purl.org/dc/terms/"/>
   </ds:schemaRefs>
 </ds:datastoreItem>
 </file>

</xml_diff>

<commit_message>
Deleted unnecessary folders. Made a few small edits to my Screen reader ttalk.
</commit_message>
<xml_diff>
--- a/Presentations/2024 Presentations/Accessibility Testing with Screen Reader.pptx
+++ b/Presentations/2024 Presentations/Accessibility Testing with Screen Reader.pptx
@@ -28894,8 +28894,12 @@
               <a:buNone/>
             </a:pPr>
             <a:r>
+              <a:rPr lang="en-US" sz="1600" b="1" dirty="0"/>
+              <a:t>Feedback @</a:t>
+            </a:r>
+            <a:r>
               <a:rPr lang="en-US" sz="1600" dirty="0"/>
-              <a:t>https://www.linkedin.com/in/corgidev</a:t>
+              <a:t> accessibility@corgidev.com</a:t>
             </a:r>
           </a:p>
         </p:txBody>
@@ -31753,6 +31757,35 @@
 </file>
 
 <file path=customXml/item1.xml><?xml version="1.0" encoding="utf-8"?>
+<?mso-contentType ?>
+<FormTemplates xmlns="http://schemas.microsoft.com/sharepoint/v3/contenttype/forms">
+  <Display>DocumentLibraryForm</Display>
+  <Edit>DocumentLibraryForm</Edit>
+  <New>DocumentLibraryForm</New>
+</FormTemplates>
+</file>
+
+<file path=customXml/item2.xml><?xml version="1.0" encoding="utf-8"?>
+<p:properties xmlns:p="http://schemas.microsoft.com/office/2006/metadata/properties" xmlns:xsi="http://www.w3.org/2001/XMLSchema-instance" xmlns:pc="http://schemas.microsoft.com/office/infopath/2007/PartnerControls">
+  <documentManagement>
+    <_ip_UnifiedCompliancePolicyUIAction xmlns="http://schemas.microsoft.com/sharepoint/v3" xsi:nil="true"/>
+    <Image xmlns="71af3243-3dd4-4a8d-8c0d-dd76da1f02a5">
+      <Url xsi:nil="true"/>
+      <Description xsi:nil="true"/>
+    </Image>
+    <Status xmlns="71af3243-3dd4-4a8d-8c0d-dd76da1f02a5">Not started</Status>
+    <Background xmlns="71af3243-3dd4-4a8d-8c0d-dd76da1f02a5">false</Background>
+    <_ip_UnifiedCompliancePolicyProperties xmlns="http://schemas.microsoft.com/sharepoint/v3" xsi:nil="true"/>
+    <ImageTagsTaxHTField xmlns="71af3243-3dd4-4a8d-8c0d-dd76da1f02a5">
+      <Terms xmlns="http://schemas.microsoft.com/office/infopath/2007/PartnerControls"/>
+    </ImageTagsTaxHTField>
+    <TaxCatchAll xmlns="230e9df3-be65-4c73-a93b-d1236ebd677e" xsi:nil="true"/>
+    <MediaServiceKeyPoints xmlns="71af3243-3dd4-4a8d-8c0d-dd76da1f02a5" xsi:nil="true"/>
+  </documentManagement>
+</p:properties>
+</file>
+
+<file path=customXml/item3.xml><?xml version="1.0" encoding="utf-8"?>
 <ct:contentTypeSchema xmlns:ct="http://schemas.microsoft.com/office/2006/metadata/contentType" xmlns:ma="http://schemas.microsoft.com/office/2006/metadata/properties/metaAttributes" ct:_="" ma:_="" ma:contentTypeName="Document" ma:contentTypeID="0x01010079F111ED35F8CC479449609E8A0923A6" ma:contentTypeVersion="28" ma:contentTypeDescription="Create a new document." ma:contentTypeScope="" ma:versionID="60f5a4f2d2b0abadcf532d48ebf9cb71">
   <xsd:schema xmlns:xsd="http://www.w3.org/2001/XMLSchema" xmlns:xs="http://www.w3.org/2001/XMLSchema" xmlns:p="http://schemas.microsoft.com/office/2006/metadata/properties" xmlns:ns1="http://schemas.microsoft.com/sharepoint/v3" xmlns:ns2="71af3243-3dd4-4a8d-8c0d-dd76da1f02a5" xmlns:ns3="16c05727-aa75-4e4a-9b5f-8a80a1165891" xmlns:ns4="230e9df3-be65-4c73-a93b-d1236ebd677e" targetNamespace="http://schemas.microsoft.com/office/2006/metadata/properties" ma:root="true" ma:fieldsID="7dd78129e6a1811f84807ad11c651531" ns1:_="" ns2:_="" ns3:_="" ns4:_="">
     <xsd:import namespace="http://schemas.microsoft.com/sharepoint/v3"/>
@@ -32064,52 +32097,10 @@
 </ct:contentTypeSchema>
 </file>
 
-<file path=customXml/item2.xml><?xml version="1.0" encoding="utf-8"?>
-<p:properties xmlns:p="http://schemas.microsoft.com/office/2006/metadata/properties" xmlns:xsi="http://www.w3.org/2001/XMLSchema-instance" xmlns:pc="http://schemas.microsoft.com/office/infopath/2007/PartnerControls">
-  <documentManagement>
-    <_ip_UnifiedCompliancePolicyUIAction xmlns="http://schemas.microsoft.com/sharepoint/v3" xsi:nil="true"/>
-    <Image xmlns="71af3243-3dd4-4a8d-8c0d-dd76da1f02a5">
-      <Url xsi:nil="true"/>
-      <Description xsi:nil="true"/>
-    </Image>
-    <Status xmlns="71af3243-3dd4-4a8d-8c0d-dd76da1f02a5">Not started</Status>
-    <Background xmlns="71af3243-3dd4-4a8d-8c0d-dd76da1f02a5">false</Background>
-    <_ip_UnifiedCompliancePolicyProperties xmlns="http://schemas.microsoft.com/sharepoint/v3" xsi:nil="true"/>
-    <ImageTagsTaxHTField xmlns="71af3243-3dd4-4a8d-8c0d-dd76da1f02a5">
-      <Terms xmlns="http://schemas.microsoft.com/office/infopath/2007/PartnerControls"/>
-    </ImageTagsTaxHTField>
-    <TaxCatchAll xmlns="230e9df3-be65-4c73-a93b-d1236ebd677e" xsi:nil="true"/>
-    <MediaServiceKeyPoints xmlns="71af3243-3dd4-4a8d-8c0d-dd76da1f02a5" xsi:nil="true"/>
-  </documentManagement>
-</p:properties>
-</file>
-
-<file path=customXml/item3.xml><?xml version="1.0" encoding="utf-8"?>
-<?mso-contentType ?>
-<FormTemplates xmlns="http://schemas.microsoft.com/sharepoint/v3/contenttype/forms">
-  <Display>DocumentLibraryForm</Display>
-  <Edit>DocumentLibraryForm</Edit>
-  <New>DocumentLibraryForm</New>
-</FormTemplates>
-</file>
-
 <file path=customXml/itemProps1.xml><?xml version="1.0" encoding="utf-8"?>
-<ds:datastoreItem xmlns:ds="http://schemas.openxmlformats.org/officeDocument/2006/customXml" ds:itemID="{16095F90-A7E0-4DA0-8E95-EB34584D62EC}">
+<ds:datastoreItem xmlns:ds="http://schemas.openxmlformats.org/officeDocument/2006/customXml" ds:itemID="{E6C52E68-191B-4883-A1EE-52F93DB694AA}">
   <ds:schemaRefs>
-    <ds:schemaRef ds:uri="http://schemas.microsoft.com/office/2006/metadata/contentType"/>
-    <ds:schemaRef ds:uri="http://schemas.microsoft.com/office/2006/metadata/properties/metaAttributes"/>
-    <ds:schemaRef ds:uri="http://www.w3.org/2001/XMLSchema"/>
-    <ds:schemaRef ds:uri="http://schemas.microsoft.com/office/2006/metadata/properties"/>
-    <ds:schemaRef ds:uri="http://schemas.microsoft.com/sharepoint/v3"/>
-    <ds:schemaRef ds:uri="71af3243-3dd4-4a8d-8c0d-dd76da1f02a5"/>
-    <ds:schemaRef ds:uri="16c05727-aa75-4e4a-9b5f-8a80a1165891"/>
-    <ds:schemaRef ds:uri="230e9df3-be65-4c73-a93b-d1236ebd677e"/>
-    <ds:schemaRef ds:uri="http://schemas.microsoft.com/office/2006/documentManagement/types"/>
-    <ds:schemaRef ds:uri="http://schemas.microsoft.com/office/infopath/2007/PartnerControls"/>
-    <ds:schemaRef ds:uri="http://schemas.openxmlformats.org/package/2006/metadata/core-properties"/>
-    <ds:schemaRef ds:uri="http://purl.org/dc/elements/1.1/"/>
-    <ds:schemaRef ds:uri="http://purl.org/dc/terms/"/>
-    <ds:schemaRef ds:uri="http://schemas.microsoft.com/internal/obd"/>
+    <ds:schemaRef ds:uri="http://schemas.microsoft.com/sharepoint/v3/contenttype/forms"/>
   </ds:schemaRefs>
 </ds:datastoreItem>
 </file>
@@ -32134,9 +32125,22 @@
 </file>
 
 <file path=customXml/itemProps3.xml><?xml version="1.0" encoding="utf-8"?>
-<ds:datastoreItem xmlns:ds="http://schemas.openxmlformats.org/officeDocument/2006/customXml" ds:itemID="{E6C52E68-191B-4883-A1EE-52F93DB694AA}">
+<ds:datastoreItem xmlns:ds="http://schemas.openxmlformats.org/officeDocument/2006/customXml" ds:itemID="{16095F90-A7E0-4DA0-8E95-EB34584D62EC}">
   <ds:schemaRefs>
-    <ds:schemaRef ds:uri="http://schemas.microsoft.com/sharepoint/v3/contenttype/forms"/>
+    <ds:schemaRef ds:uri="http://schemas.microsoft.com/office/2006/metadata/contentType"/>
+    <ds:schemaRef ds:uri="http://schemas.microsoft.com/office/2006/metadata/properties/metaAttributes"/>
+    <ds:schemaRef ds:uri="http://www.w3.org/2001/XMLSchema"/>
+    <ds:schemaRef ds:uri="http://schemas.microsoft.com/office/2006/metadata/properties"/>
+    <ds:schemaRef ds:uri="http://schemas.microsoft.com/sharepoint/v3"/>
+    <ds:schemaRef ds:uri="71af3243-3dd4-4a8d-8c0d-dd76da1f02a5"/>
+    <ds:schemaRef ds:uri="16c05727-aa75-4e4a-9b5f-8a80a1165891"/>
+    <ds:schemaRef ds:uri="230e9df3-be65-4c73-a93b-d1236ebd677e"/>
+    <ds:schemaRef ds:uri="http://schemas.microsoft.com/office/2006/documentManagement/types"/>
+    <ds:schemaRef ds:uri="http://schemas.microsoft.com/office/infopath/2007/PartnerControls"/>
+    <ds:schemaRef ds:uri="http://schemas.openxmlformats.org/package/2006/metadata/core-properties"/>
+    <ds:schemaRef ds:uri="http://purl.org/dc/elements/1.1/"/>
+    <ds:schemaRef ds:uri="http://purl.org/dc/terms/"/>
+    <ds:schemaRef ds:uri="http://schemas.microsoft.com/internal/obd"/>
   </ds:schemaRefs>
 </ds:datastoreItem>
 </file>

</xml_diff>

<commit_message>
Added Cincy Deliver version of Screen Reader talk
</commit_message>
<xml_diff>
--- a/Presentations/2024 Presentations/Accessibility Testing with Screen Reader.pptx
+++ b/Presentations/2024 Presentations/Accessibility Testing with Screen Reader.pptx
@@ -240,7 +240,7 @@
           <a:p>
             <a:fld id="{EE5432EF-245E-40EF-B3FF-B189D54EF7CF}" type="datetimeFigureOut">
               <a:rPr lang="en-US" smtClean="0"/>
-              <a:t>3/28/2024</a:t>
+              <a:t>7/24/2024</a:t>
             </a:fld>
             <a:endParaRPr lang="en-US" dirty="0"/>
           </a:p>
@@ -417,7 +417,7 @@
           <a:p>
             <a:fld id="{6AF08D30-F807-4561-A81E-6E077448AA00}" type="datetimeFigureOut">
               <a:rPr lang="en-US" smtClean="0"/>
-              <a:t>3/28/2024</a:t>
+              <a:t>7/24/2024</a:t>
             </a:fld>
             <a:endParaRPr lang="en-US" dirty="0"/>
           </a:p>
@@ -4877,7 +4877,7 @@
           <a:p>
             <a:fld id="{D40CD771-3B55-4F71-A412-F2B875D7B621}" type="datetime1">
               <a:rPr lang="en-US" smtClean="0"/>
-              <a:t>3/28/2024</a:t>
+              <a:t>7/24/2024</a:t>
             </a:fld>
             <a:endParaRPr lang="en-US" dirty="0"/>
           </a:p>
@@ -5448,7 +5448,7 @@
           <a:p>
             <a:fld id="{DD565FA3-C3AD-4028-B5DD-84D9CECFBB89}" type="datetime1">
               <a:rPr lang="en-US" smtClean="0"/>
-              <a:t>3/28/2024</a:t>
+              <a:t>7/24/2024</a:t>
             </a:fld>
             <a:endParaRPr lang="en-US" dirty="0"/>
           </a:p>
@@ -6483,7 +6483,7 @@
           <a:p>
             <a:fld id="{3BD4ADB0-2200-4ADA-8C14-3FC7CEFC81F7}" type="datetime1">
               <a:rPr lang="en-US" smtClean="0"/>
-              <a:t>3/28/2024</a:t>
+              <a:t>7/24/2024</a:t>
             </a:fld>
             <a:endParaRPr lang="en-US" dirty="0"/>
           </a:p>
@@ -7369,7 +7369,7 @@
           <a:p>
             <a:fld id="{3CD0E6B3-1484-43A7-852A-7CEAE8B79EC0}" type="datetime1">
               <a:rPr lang="en-US" smtClean="0"/>
-              <a:t>3/28/2024</a:t>
+              <a:t>7/24/2024</a:t>
             </a:fld>
             <a:endParaRPr lang="en-US" dirty="0"/>
           </a:p>
@@ -8687,7 +8687,7 @@
           <a:p>
             <a:fld id="{2BEFEC11-A4AD-4C89-8ACD-8FF27A79E89E}" type="datetime1">
               <a:rPr lang="en-US" smtClean="0"/>
-              <a:t>3/28/2024</a:t>
+              <a:t>7/24/2024</a:t>
             </a:fld>
             <a:endParaRPr lang="en-US" dirty="0"/>
           </a:p>
@@ -10403,7 +10403,7 @@
           <a:p>
             <a:fld id="{3135798D-CCB3-4270-966B-D99874338BAB}" type="datetime1">
               <a:rPr lang="en-US" smtClean="0"/>
-              <a:t>3/28/2024</a:t>
+              <a:t>7/24/2024</a:t>
             </a:fld>
             <a:endParaRPr lang="en-US" dirty="0"/>
           </a:p>
@@ -12124,7 +12124,7 @@
           <a:p>
             <a:fld id="{D2A641F7-70A7-4C80-8B54-47DC93A76399}" type="datetime1">
               <a:rPr lang="en-US" smtClean="0"/>
-              <a:t>3/28/2024</a:t>
+              <a:t>7/24/2024</a:t>
             </a:fld>
             <a:endParaRPr lang="en-US" dirty="0"/>
           </a:p>
@@ -12540,7 +12540,7 @@
           <a:p>
             <a:fld id="{1FFC9F40-B774-4ADF-976D-7826EBFC23FC}" type="datetime1">
               <a:rPr lang="en-US" smtClean="0"/>
-              <a:t>3/28/2024</a:t>
+              <a:t>7/24/2024</a:t>
             </a:fld>
             <a:endParaRPr lang="en-US" dirty="0"/>
           </a:p>
@@ -14424,7 +14424,7 @@
           <a:p>
             <a:fld id="{1EA8AE22-5AA9-4E68-B910-53534A46D111}" type="datetime1">
               <a:rPr lang="en-US" smtClean="0"/>
-              <a:t>3/28/2024</a:t>
+              <a:t>7/24/2024</a:t>
             </a:fld>
             <a:endParaRPr lang="en-US" dirty="0"/>
           </a:p>
@@ -15409,7 +15409,7 @@
           <a:p>
             <a:fld id="{F342984A-CABF-4466-A44F-F97A782DF502}" type="datetime1">
               <a:rPr lang="en-US" smtClean="0"/>
-              <a:t>3/28/2024</a:t>
+              <a:t>7/24/2024</a:t>
             </a:fld>
             <a:endParaRPr lang="en-US" dirty="0"/>
           </a:p>
@@ -16381,7 +16381,7 @@
           <a:p>
             <a:fld id="{8D28DA4F-55EE-4774-AFC6-2F73931F16BE}" type="datetime1">
               <a:rPr lang="en-US" smtClean="0"/>
-              <a:t>3/28/2024</a:t>
+              <a:t>7/24/2024</a:t>
             </a:fld>
             <a:endParaRPr lang="en-US" dirty="0"/>
           </a:p>
@@ -17595,7 +17595,7 @@
           <a:p>
             <a:fld id="{49BF4A40-B160-41AB-BD66-51E4EFBE2604}" type="datetime1">
               <a:rPr lang="en-US" smtClean="0"/>
-              <a:t>3/28/2024</a:t>
+              <a:t>7/24/2024</a:t>
             </a:fld>
             <a:endParaRPr lang="en-US" dirty="0"/>
           </a:p>
@@ -18915,7 +18915,7 @@
           <a:p>
             <a:fld id="{A2D678BB-696D-42DB-BEC8-FB9987E03170}" type="datetime1">
               <a:rPr lang="en-US" smtClean="0"/>
-              <a:t>3/28/2024</a:t>
+              <a:t>7/24/2024</a:t>
             </a:fld>
             <a:endParaRPr lang="en-US" dirty="0"/>
           </a:p>
@@ -21294,7 +21294,7 @@
           <a:p>
             <a:fld id="{1162C2D5-1148-46A1-BEF2-DD9C492A8B49}" type="datetime1">
               <a:rPr lang="en-US" smtClean="0"/>
-              <a:t>3/28/2024</a:t>
+              <a:t>7/24/2024</a:t>
             </a:fld>
             <a:endParaRPr lang="en-US" dirty="0"/>
           </a:p>
@@ -23715,7 +23715,7 @@
           <a:p>
             <a:fld id="{965B5B8E-CEE3-4EB8-9D7E-B72C8551397A}" type="datetime1">
               <a:rPr lang="en-US" smtClean="0"/>
-              <a:t>3/28/2024</a:t>
+              <a:t>7/24/2024</a:t>
             </a:fld>
             <a:endParaRPr lang="en-US" dirty="0"/>
           </a:p>
@@ -25400,7 +25400,7 @@
           <a:p>
             <a:fld id="{76A4DFCB-51DE-424A-8B5B-467EFB151E38}" type="datetime1">
               <a:rPr lang="en-US" smtClean="0"/>
-              <a:t>3/28/2024</a:t>
+              <a:t>7/24/2024</a:t>
             </a:fld>
             <a:endParaRPr lang="en-US" dirty="0"/>
           </a:p>
@@ -25650,7 +25650,7 @@
           <a:p>
             <a:fld id="{CE7CABBA-7921-40BC-AA51-20F01765FD57}" type="datetime1">
               <a:rPr lang="en-US" smtClean="0"/>
-              <a:t>3/28/2024</a:t>
+              <a:t>7/24/2024</a:t>
             </a:fld>
             <a:endParaRPr lang="en-US" dirty="0"/>
           </a:p>
@@ -27300,7 +27300,7 @@
           <a:p>
             <a:fld id="{2DE70F3C-A523-425F-99C2-A38FEF5AAA8E}" type="datetime1">
               <a:rPr lang="en-US" smtClean="0"/>
-              <a:t>3/28/2024</a:t>
+              <a:t>7/24/2024</a:t>
             </a:fld>
             <a:endParaRPr lang="en-US" dirty="0"/>
           </a:p>
@@ -27687,7 +27687,7 @@
           <a:p>
             <a:fld id="{365C6142-4DC0-4393-AD7A-3943A8E630E4}" type="datetime1">
               <a:rPr lang="en-US" smtClean="0"/>
-              <a:t>3/28/2024</a:t>
+              <a:t>7/24/2024</a:t>
             </a:fld>
             <a:endParaRPr lang="en-US" dirty="0"/>
           </a:p>
@@ -28436,7 +28436,7 @@
           <a:p>
             <a:fld id="{EBA72B5A-673D-4607-9FF7-CCF53A6CFB8C}" type="datetime1">
               <a:rPr lang="en-US" smtClean="0"/>
-              <a:t>3/28/2024</a:t>
+              <a:t>7/24/2024</a:t>
             </a:fld>
             <a:endParaRPr lang="en-US" dirty="0"/>
           </a:p>
@@ -28681,7 +28681,7 @@
           <a:p>
             <a:fld id="{2A82BCC9-1E0F-4681-A8CA-371CB2B2FD36}" type="datetime1">
               <a:rPr lang="en-US" smtClean="0"/>
-              <a:t>3/28/2024</a:t>
+              <a:t>7/24/2024</a:t>
             </a:fld>
             <a:endParaRPr lang="en-US" dirty="0"/>
           </a:p>
@@ -28965,7 +28965,7 @@
           <a:p>
             <a:fld id="{1E6DE020-595E-4414-9FD4-E492968BB4DD}" type="datetime1">
               <a:rPr lang="en-US" smtClean="0"/>
-              <a:t>3/28/2024</a:t>
+              <a:t>7/24/2024</a:t>
             </a:fld>
             <a:endParaRPr lang="en-US" dirty="0"/>
           </a:p>
@@ -29155,7 +29155,7 @@
           <a:p>
             <a:fld id="{09C89640-83B5-41BC-A234-8A25CEA3CA37}" type="datetime1">
               <a:rPr lang="en-US" smtClean="0"/>
-              <a:t>3/28/2024</a:t>
+              <a:t>7/24/2024</a:t>
             </a:fld>
             <a:endParaRPr lang="en-US" dirty="0"/>
           </a:p>
@@ -29616,7 +29616,7 @@
           <a:p>
             <a:fld id="{1EA8AE22-5AA9-4E68-B910-53534A46D111}" type="datetime1">
               <a:rPr lang="en-US" smtClean="0"/>
-              <a:t>3/28/2024</a:t>
+              <a:t>7/24/2024</a:t>
             </a:fld>
             <a:endParaRPr lang="en-US" dirty="0"/>
           </a:p>
@@ -29809,7 +29809,7 @@
           <a:p>
             <a:fld id="{02020E9F-7472-46E2-925D-3834C3399EB8}" type="datetime1">
               <a:rPr lang="en-US" smtClean="0"/>
-              <a:t>3/28/2024</a:t>
+              <a:t>7/24/2024</a:t>
             </a:fld>
             <a:endParaRPr lang="en-US" dirty="0"/>
           </a:p>
@@ -30012,7 +30012,7 @@
           <a:p>
             <a:fld id="{FE57B65C-736A-463A-B878-00376E835189}" type="datetime1">
               <a:rPr lang="en-US" smtClean="0"/>
-              <a:t>3/28/2024</a:t>
+              <a:t>7/24/2024</a:t>
             </a:fld>
             <a:endParaRPr lang="en-US" dirty="0"/>
           </a:p>
@@ -30213,7 +30213,7 @@
           <a:p>
             <a:fld id="{F62B3EC1-C48E-40CA-B644-780608C10782}" type="datetime1">
               <a:rPr lang="en-US" smtClean="0"/>
-              <a:t>3/28/2024</a:t>
+              <a:t>7/24/2024</a:t>
             </a:fld>
             <a:endParaRPr lang="en-US" dirty="0"/>
           </a:p>
@@ -30473,7 +30473,7 @@
           <a:p>
             <a:fld id="{D848C455-CDB2-4208-A65A-BF4D86A5E68B}" type="datetime1">
               <a:rPr lang="en-US" smtClean="0"/>
-              <a:t>3/28/2024</a:t>
+              <a:t>7/24/2024</a:t>
             </a:fld>
             <a:endParaRPr lang="en-US" dirty="0"/>
           </a:p>
@@ -30651,7 +30651,7 @@
           <a:p>
             <a:fld id="{CDC15CAB-FD5C-4E8D-A715-31333DAF8D3F}" type="datetime1">
               <a:rPr lang="en-US" smtClean="0"/>
-              <a:t>3/28/2024</a:t>
+              <a:t>7/24/2024</a:t>
             </a:fld>
             <a:endParaRPr lang="en-US" dirty="0"/>
           </a:p>
@@ -30854,7 +30854,7 @@
           <a:p>
             <a:fld id="{11B39263-7CDE-4839-88A7-EB9F08F894B1}" type="datetime1">
               <a:rPr lang="en-US" smtClean="0"/>
-              <a:t>3/28/2024</a:t>
+              <a:t>7/24/2024</a:t>
             </a:fld>
             <a:endParaRPr lang="en-US" dirty="0"/>
           </a:p>

</xml_diff>